<commit_message>
ejercicios semana 4, misma presentacion de semana 3
</commit_message>
<xml_diff>
--- a/Semana 3.pptx
+++ b/Semana 3.pptx
@@ -14,6 +14,9 @@
     <p:sldId id="267" r:id="rId8"/>
     <p:sldId id="264" r:id="rId9"/>
     <p:sldId id="265" r:id="rId10"/>
+    <p:sldId id="268" r:id="rId11"/>
+    <p:sldId id="269" r:id="rId12"/>
+    <p:sldId id="270" r:id="rId13"/>
   </p:sldIdLst>
   <p:sldSz cx="9144000" cy="6858000" type="screen4x3"/>
   <p:notesSz cx="6858000" cy="9144000"/>
@@ -303,7 +306,7 @@
           <a:p>
             <a:fld id="{2BD09FA6-5415-4E41-8EC0-843F16C90881}" type="datetimeFigureOut">
               <a:rPr lang="en-US" smtClean="0"/>
-              <a:t>1/30/2018</a:t>
+              <a:t>2/3/2018</a:t>
             </a:fld>
             <a:endParaRPr lang="en-US"/>
           </a:p>
@@ -503,7 +506,7 @@
           <a:p>
             <a:fld id="{2BD09FA6-5415-4E41-8EC0-843F16C90881}" type="datetimeFigureOut">
               <a:rPr lang="en-US" smtClean="0"/>
-              <a:t>1/30/2018</a:t>
+              <a:t>2/3/2018</a:t>
             </a:fld>
             <a:endParaRPr lang="en-US"/>
           </a:p>
@@ -678,7 +681,7 @@
           <a:p>
             <a:fld id="{2BD09FA6-5415-4E41-8EC0-843F16C90881}" type="datetimeFigureOut">
               <a:rPr lang="en-US" smtClean="0"/>
-              <a:t>1/30/2018</a:t>
+              <a:t>2/3/2018</a:t>
             </a:fld>
             <a:endParaRPr lang="en-US"/>
           </a:p>
@@ -843,7 +846,7 @@
           <a:p>
             <a:fld id="{2BD09FA6-5415-4E41-8EC0-843F16C90881}" type="datetimeFigureOut">
               <a:rPr lang="en-US" smtClean="0"/>
-              <a:t>1/30/2018</a:t>
+              <a:t>2/3/2018</a:t>
             </a:fld>
             <a:endParaRPr lang="en-US"/>
           </a:p>
@@ -1091,7 +1094,7 @@
           <a:p>
             <a:fld id="{2BD09FA6-5415-4E41-8EC0-843F16C90881}" type="datetimeFigureOut">
               <a:rPr lang="en-US" smtClean="0"/>
-              <a:t>1/30/2018</a:t>
+              <a:t>2/3/2018</a:t>
             </a:fld>
             <a:endParaRPr lang="en-US"/>
           </a:p>
@@ -1409,7 +1412,7 @@
           <a:p>
             <a:fld id="{2BD09FA6-5415-4E41-8EC0-843F16C90881}" type="datetimeFigureOut">
               <a:rPr lang="en-US" smtClean="0"/>
-              <a:t>1/30/2018</a:t>
+              <a:t>2/3/2018</a:t>
             </a:fld>
             <a:endParaRPr lang="en-US"/>
           </a:p>
@@ -1875,7 +1878,7 @@
           <a:p>
             <a:fld id="{2BD09FA6-5415-4E41-8EC0-843F16C90881}" type="datetimeFigureOut">
               <a:rPr lang="en-US" smtClean="0"/>
-              <a:t>1/30/2018</a:t>
+              <a:t>2/3/2018</a:t>
             </a:fld>
             <a:endParaRPr lang="en-US"/>
           </a:p>
@@ -2023,7 +2026,7 @@
           <a:p>
             <a:fld id="{2BD09FA6-5415-4E41-8EC0-843F16C90881}" type="datetimeFigureOut">
               <a:rPr lang="en-US" smtClean="0"/>
-              <a:t>1/30/2018</a:t>
+              <a:t>2/3/2018</a:t>
             </a:fld>
             <a:endParaRPr lang="en-US"/>
           </a:p>
@@ -2113,7 +2116,7 @@
           <a:p>
             <a:fld id="{2BD09FA6-5415-4E41-8EC0-843F16C90881}" type="datetimeFigureOut">
               <a:rPr lang="en-US" smtClean="0"/>
-              <a:t>1/30/2018</a:t>
+              <a:t>2/3/2018</a:t>
             </a:fld>
             <a:endParaRPr lang="en-US"/>
           </a:p>
@@ -2387,7 +2390,7 @@
           <a:p>
             <a:fld id="{2BD09FA6-5415-4E41-8EC0-843F16C90881}" type="datetimeFigureOut">
               <a:rPr lang="en-US" smtClean="0"/>
-              <a:t>1/30/2018</a:t>
+              <a:t>2/3/2018</a:t>
             </a:fld>
             <a:endParaRPr lang="en-US"/>
           </a:p>
@@ -2692,7 +2695,7 @@
           <a:p>
             <a:fld id="{2BD09FA6-5415-4E41-8EC0-843F16C90881}" type="datetimeFigureOut">
               <a:rPr lang="en-US" smtClean="0"/>
-              <a:t>1/30/2018</a:t>
+              <a:t>2/3/2018</a:t>
             </a:fld>
             <a:endParaRPr lang="en-US"/>
           </a:p>
@@ -2990,7 +2993,7 @@
           <a:p>
             <a:fld id="{2BD09FA6-5415-4E41-8EC0-843F16C90881}" type="datetimeFigureOut">
               <a:rPr lang="en-US" smtClean="0"/>
-              <a:t>1/30/2018</a:t>
+              <a:t>2/3/2018</a:t>
             </a:fld>
             <a:endParaRPr lang="en-US"/>
           </a:p>
@@ -3501,6 +3504,1348 @@
     <p:extLst>
       <p:ext uri="{BB962C8B-B14F-4D97-AF65-F5344CB8AC3E}">
         <p14:creationId xmlns:p14="http://schemas.microsoft.com/office/powerpoint/2010/main" val="4116553065"/>
+      </p:ext>
+    </p:extLst>
+  </p:cSld>
+  <p:clrMapOvr>
+    <a:masterClrMapping/>
+  </p:clrMapOvr>
+  <p:timing>
+    <p:tnLst>
+      <p:par>
+        <p:cTn id="1" dur="indefinite" restart="never" nodeType="tmRoot"/>
+      </p:par>
+    </p:tnLst>
+  </p:timing>
+</p:sld>
+</file>
+
+<file path=ppt/slides/slide10.xml><?xml version="1.0" encoding="utf-8"?>
+<p:sld xmlns:a="http://schemas.openxmlformats.org/drawingml/2006/main" xmlns:r="http://schemas.openxmlformats.org/officeDocument/2006/relationships" xmlns:p="http://schemas.openxmlformats.org/presentationml/2006/main">
+  <p:cSld>
+    <p:spTree>
+      <p:nvGrpSpPr>
+        <p:cNvPr id="1" name=""/>
+        <p:cNvGrpSpPr/>
+        <p:nvPr/>
+      </p:nvGrpSpPr>
+      <p:grpSpPr>
+        <a:xfrm>
+          <a:off x="0" y="0"/>
+          <a:ext cx="0" cy="0"/>
+          <a:chOff x="0" y="0"/>
+          <a:chExt cx="0" cy="0"/>
+        </a:xfrm>
+      </p:grpSpPr>
+      <p:sp>
+        <p:nvSpPr>
+          <p:cNvPr id="2" name="Title 1"/>
+          <p:cNvSpPr>
+            <a:spLocks noGrp="1"/>
+          </p:cNvSpPr>
+          <p:nvPr>
+            <p:ph type="title"/>
+          </p:nvPr>
+        </p:nvSpPr>
+        <p:spPr/>
+        <p:txBody>
+          <a:bodyPr/>
+          <a:lstStyle/>
+          <a:p>
+            <a:r>
+              <a:rPr lang="en-US" dirty="0" smtClean="0"/>
+              <a:t>Java – </a:t>
+            </a:r>
+            <a:r>
+              <a:rPr lang="en-US" dirty="0" err="1" smtClean="0"/>
+              <a:t>ejercicio</a:t>
+            </a:r>
+            <a:r>
+              <a:rPr lang="en-US" dirty="0" err="1" smtClean="0"/>
+              <a:t>s</a:t>
+            </a:r>
+            <a:endParaRPr lang="en-US" dirty="0"/>
+          </a:p>
+        </p:txBody>
+      </p:sp>
+      <p:sp>
+        <p:nvSpPr>
+          <p:cNvPr id="3" name="Content Placeholder 2"/>
+          <p:cNvSpPr>
+            <a:spLocks noGrp="1"/>
+          </p:cNvSpPr>
+          <p:nvPr>
+            <p:ph idx="1"/>
+          </p:nvPr>
+        </p:nvSpPr>
+        <p:spPr/>
+        <p:txBody>
+          <a:bodyPr>
+            <a:normAutofit lnSpcReduction="10000"/>
+          </a:bodyPr>
+          <a:lstStyle/>
+          <a:p>
+            <a:r>
+              <a:rPr lang="en-US" dirty="0" err="1"/>
+              <a:t>Construya</a:t>
+            </a:r>
+            <a:r>
+              <a:rPr lang="en-US" dirty="0"/>
+              <a:t> un </a:t>
+            </a:r>
+            <a:r>
+              <a:rPr lang="en-US" dirty="0" err="1"/>
+              <a:t>programa</a:t>
+            </a:r>
+            <a:r>
+              <a:rPr lang="en-US" dirty="0"/>
+              <a:t> </a:t>
+            </a:r>
+            <a:r>
+              <a:rPr lang="en-US" dirty="0" err="1"/>
+              <a:t>que</a:t>
+            </a:r>
+            <a:r>
+              <a:rPr lang="en-US" dirty="0"/>
+              <a:t> </a:t>
+            </a:r>
+            <a:r>
+              <a:rPr lang="en-US" dirty="0" err="1"/>
+              <a:t>imprima</a:t>
+            </a:r>
+            <a:r>
+              <a:rPr lang="en-US" dirty="0"/>
+              <a:t> la </a:t>
+            </a:r>
+            <a:r>
+              <a:rPr lang="en-US" dirty="0" err="1"/>
+              <a:t>tabla</a:t>
+            </a:r>
+            <a:r>
+              <a:rPr lang="en-US" dirty="0"/>
+              <a:t> de </a:t>
+            </a:r>
+            <a:r>
+              <a:rPr lang="en-US" dirty="0" err="1"/>
+              <a:t>multiplicar</a:t>
+            </a:r>
+            <a:r>
+              <a:rPr lang="en-US" dirty="0"/>
+              <a:t> de un </a:t>
+            </a:r>
+            <a:r>
+              <a:rPr lang="en-US" dirty="0" err="1"/>
+              <a:t>número</a:t>
+            </a:r>
+            <a:r>
+              <a:rPr lang="en-US" dirty="0"/>
+              <a:t> </a:t>
+            </a:r>
+            <a:r>
+              <a:rPr lang="en-US" dirty="0" err="1"/>
+              <a:t>ingresado</a:t>
+            </a:r>
+            <a:r>
+              <a:rPr lang="en-US" dirty="0"/>
+              <a:t> en el </a:t>
+            </a:r>
+            <a:r>
+              <a:rPr lang="en-US" dirty="0" err="1"/>
+              <a:t>teclado</a:t>
+            </a:r>
+            <a:r>
+              <a:rPr lang="en-US" dirty="0"/>
+              <a:t>, </a:t>
+            </a:r>
+            <a:r>
+              <a:rPr lang="en-US" dirty="0" err="1"/>
+              <a:t>empezando</a:t>
+            </a:r>
+            <a:r>
+              <a:rPr lang="en-US" dirty="0"/>
+              <a:t> de 0</a:t>
+            </a:r>
+            <a:r>
+              <a:rPr lang="en-US" dirty="0" smtClean="0"/>
+              <a:t>.</a:t>
+            </a:r>
+          </a:p>
+          <a:p>
+            <a:r>
+              <a:rPr lang="en-US" dirty="0" err="1"/>
+              <a:t>Construya</a:t>
+            </a:r>
+            <a:r>
+              <a:rPr lang="en-US" dirty="0"/>
+              <a:t> un </a:t>
+            </a:r>
+            <a:r>
+              <a:rPr lang="en-US" dirty="0" err="1"/>
+              <a:t>programa</a:t>
+            </a:r>
+            <a:r>
+              <a:rPr lang="en-US" dirty="0"/>
+              <a:t> </a:t>
+            </a:r>
+            <a:r>
+              <a:rPr lang="en-US" dirty="0" err="1"/>
+              <a:t>que</a:t>
+            </a:r>
+            <a:r>
+              <a:rPr lang="en-US" dirty="0"/>
+              <a:t> </a:t>
+            </a:r>
+            <a:r>
+              <a:rPr lang="en-US" dirty="0" err="1"/>
+              <a:t>defina</a:t>
+            </a:r>
+            <a:r>
+              <a:rPr lang="en-US" dirty="0"/>
+              <a:t> </a:t>
+            </a:r>
+            <a:r>
+              <a:rPr lang="en-US" dirty="0" err="1"/>
+              <a:t>si</a:t>
+            </a:r>
+            <a:r>
+              <a:rPr lang="en-US" dirty="0"/>
+              <a:t> un </a:t>
+            </a:r>
+            <a:r>
+              <a:rPr lang="en-US" dirty="0" err="1"/>
+              <a:t>número</a:t>
+            </a:r>
+            <a:r>
+              <a:rPr lang="en-US" dirty="0"/>
+              <a:t> </a:t>
+            </a:r>
+            <a:r>
+              <a:rPr lang="en-US" dirty="0" err="1" smtClean="0"/>
+              <a:t>entero</a:t>
+            </a:r>
+            <a:r>
+              <a:rPr lang="en-US" dirty="0" smtClean="0"/>
+              <a:t> dado </a:t>
+            </a:r>
+            <a:r>
+              <a:rPr lang="en-US" dirty="0" err="1"/>
+              <a:t>es</a:t>
+            </a:r>
+            <a:r>
+              <a:rPr lang="en-US" dirty="0"/>
+              <a:t> el </a:t>
+            </a:r>
+            <a:r>
+              <a:rPr lang="en-US" dirty="0" err="1"/>
+              <a:t>resultado</a:t>
+            </a:r>
+            <a:r>
+              <a:rPr lang="en-US" dirty="0"/>
+              <a:t> de </a:t>
+            </a:r>
+            <a:r>
+              <a:rPr lang="en-US" dirty="0" err="1"/>
+              <a:t>multiplicar</a:t>
+            </a:r>
+            <a:r>
+              <a:rPr lang="en-US" dirty="0"/>
+              <a:t> un </a:t>
+            </a:r>
+            <a:r>
+              <a:rPr lang="en-US" dirty="0" err="1"/>
+              <a:t>numero</a:t>
+            </a:r>
+            <a:r>
+              <a:rPr lang="en-US" dirty="0"/>
+              <a:t> </a:t>
+            </a:r>
+            <a:r>
+              <a:rPr lang="en-US" dirty="0" err="1"/>
+              <a:t>impar</a:t>
+            </a:r>
+            <a:r>
+              <a:rPr lang="en-US" dirty="0"/>
+              <a:t> </a:t>
+            </a:r>
+            <a:r>
+              <a:rPr lang="en-US" dirty="0" err="1"/>
+              <a:t>por</a:t>
+            </a:r>
+            <a:r>
+              <a:rPr lang="en-US" dirty="0"/>
+              <a:t> dos. </a:t>
+            </a:r>
+            <a:r>
+              <a:rPr lang="en-US" dirty="0" err="1"/>
+              <a:t>Por</a:t>
+            </a:r>
+            <a:r>
+              <a:rPr lang="en-US" dirty="0"/>
+              <a:t> </a:t>
+            </a:r>
+            <a:r>
+              <a:rPr lang="en-US" dirty="0" err="1"/>
+              <a:t>ejemplo</a:t>
+            </a:r>
+            <a:r>
+              <a:rPr lang="en-US" dirty="0"/>
+              <a:t> 14 </a:t>
+            </a:r>
+            <a:r>
+              <a:rPr lang="en-US" dirty="0" err="1"/>
+              <a:t>es</a:t>
+            </a:r>
+            <a:r>
+              <a:rPr lang="en-US" dirty="0"/>
+              <a:t> el </a:t>
+            </a:r>
+            <a:r>
+              <a:rPr lang="en-US" dirty="0" err="1"/>
+              <a:t>resultado</a:t>
+            </a:r>
+            <a:r>
+              <a:rPr lang="en-US" dirty="0"/>
+              <a:t> de </a:t>
+            </a:r>
+            <a:r>
+              <a:rPr lang="en-US" dirty="0" err="1"/>
+              <a:t>multiplicar</a:t>
+            </a:r>
+            <a:r>
+              <a:rPr lang="en-US" dirty="0"/>
+              <a:t> 7 * 2. En </a:t>
+            </a:r>
+            <a:r>
+              <a:rPr lang="en-US" dirty="0" err="1"/>
+              <a:t>caso</a:t>
+            </a:r>
+            <a:r>
+              <a:rPr lang="en-US" dirty="0"/>
+              <a:t> de </a:t>
+            </a:r>
+            <a:r>
+              <a:rPr lang="en-US" dirty="0" err="1"/>
+              <a:t>que</a:t>
+            </a:r>
+            <a:r>
+              <a:rPr lang="en-US" dirty="0"/>
+              <a:t> </a:t>
+            </a:r>
+            <a:r>
+              <a:rPr lang="en-US" dirty="0" err="1"/>
+              <a:t>esta</a:t>
+            </a:r>
+            <a:r>
+              <a:rPr lang="en-US" dirty="0"/>
+              <a:t> </a:t>
+            </a:r>
+            <a:r>
+              <a:rPr lang="en-US" dirty="0" err="1"/>
+              <a:t>condición</a:t>
+            </a:r>
+            <a:r>
+              <a:rPr lang="en-US" dirty="0"/>
+              <a:t> se </a:t>
+            </a:r>
+            <a:r>
+              <a:rPr lang="en-US" dirty="0" err="1"/>
+              <a:t>cumpla</a:t>
+            </a:r>
+            <a:r>
+              <a:rPr lang="en-US" dirty="0"/>
+              <a:t>, </a:t>
+            </a:r>
+            <a:r>
+              <a:rPr lang="en-US" dirty="0" err="1"/>
+              <a:t>debe</a:t>
+            </a:r>
+            <a:r>
+              <a:rPr lang="en-US" dirty="0"/>
+              <a:t> </a:t>
+            </a:r>
+            <a:r>
+              <a:rPr lang="en-US" dirty="0" err="1"/>
+              <a:t>imprimirlo</a:t>
+            </a:r>
+            <a:r>
+              <a:rPr lang="en-US" dirty="0"/>
+              <a:t>. </a:t>
+            </a:r>
+          </a:p>
+          <a:p>
+            <a:r>
+              <a:rPr lang="en-US" dirty="0" smtClean="0"/>
+              <a:t>Cree </a:t>
+            </a:r>
+            <a:r>
+              <a:rPr lang="en-US" dirty="0"/>
+              <a:t>un </a:t>
+            </a:r>
+            <a:r>
+              <a:rPr lang="en-US" dirty="0" err="1" smtClean="0"/>
+              <a:t>programa</a:t>
+            </a:r>
+            <a:r>
+              <a:rPr lang="en-US" dirty="0" smtClean="0"/>
+              <a:t> </a:t>
+            </a:r>
+            <a:r>
+              <a:rPr lang="en-US" dirty="0" err="1" smtClean="0"/>
+              <a:t>que</a:t>
+            </a:r>
+            <a:r>
+              <a:rPr lang="en-US" dirty="0"/>
+              <a:t>, lea un </a:t>
+            </a:r>
+            <a:r>
+              <a:rPr lang="en-US" dirty="0" err="1"/>
+              <a:t>monto</a:t>
+            </a:r>
+            <a:r>
+              <a:rPr lang="en-US" dirty="0"/>
+              <a:t> en </a:t>
+            </a:r>
+            <a:r>
+              <a:rPr lang="en-US" dirty="0" err="1"/>
+              <a:t>colones</a:t>
+            </a:r>
+            <a:r>
+              <a:rPr lang="en-US" dirty="0"/>
+              <a:t> y </a:t>
+            </a:r>
+            <a:r>
+              <a:rPr lang="en-US" dirty="0" err="1"/>
+              <a:t>después</a:t>
+            </a:r>
+            <a:r>
+              <a:rPr lang="en-US" dirty="0"/>
+              <a:t> </a:t>
+            </a:r>
+            <a:r>
+              <a:rPr lang="en-US" dirty="0" err="1"/>
+              <a:t>convierta</a:t>
+            </a:r>
+            <a:r>
+              <a:rPr lang="en-US" dirty="0"/>
+              <a:t> el </a:t>
+            </a:r>
+            <a:r>
+              <a:rPr lang="en-US" dirty="0" err="1"/>
+              <a:t>monto</a:t>
+            </a:r>
+            <a:r>
+              <a:rPr lang="en-US" dirty="0"/>
+              <a:t> a </a:t>
+            </a:r>
+            <a:r>
+              <a:rPr lang="en-US" dirty="0" err="1"/>
+              <a:t>dólares</a:t>
+            </a:r>
+            <a:r>
+              <a:rPr lang="en-US" dirty="0"/>
+              <a:t> o euros </a:t>
+            </a:r>
+            <a:r>
+              <a:rPr lang="en-US" dirty="0" err="1"/>
+              <a:t>según</a:t>
+            </a:r>
+            <a:r>
+              <a:rPr lang="en-US" dirty="0"/>
+              <a:t> </a:t>
+            </a:r>
+            <a:r>
+              <a:rPr lang="en-US" dirty="0" err="1"/>
+              <a:t>seleccione</a:t>
+            </a:r>
+            <a:r>
+              <a:rPr lang="en-US" dirty="0"/>
+              <a:t> el </a:t>
+            </a:r>
+            <a:r>
+              <a:rPr lang="en-US" dirty="0" err="1"/>
+              <a:t>usuario</a:t>
+            </a:r>
+            <a:r>
+              <a:rPr lang="en-US" dirty="0"/>
+              <a:t>.</a:t>
+            </a:r>
+          </a:p>
+          <a:p>
+            <a:pPr lvl="1"/>
+            <a:r>
+              <a:rPr lang="en-US" dirty="0" err="1"/>
+              <a:t>Tipo</a:t>
+            </a:r>
+            <a:r>
+              <a:rPr lang="en-US" dirty="0"/>
+              <a:t> de </a:t>
+            </a:r>
+            <a:r>
+              <a:rPr lang="en-US" dirty="0" err="1"/>
+              <a:t>cambio</a:t>
+            </a:r>
+            <a:r>
+              <a:rPr lang="en-US" dirty="0"/>
+              <a:t> del </a:t>
+            </a:r>
+            <a:r>
+              <a:rPr lang="en-US" dirty="0" err="1"/>
+              <a:t>dólar</a:t>
+            </a:r>
+            <a:r>
+              <a:rPr lang="en-US" dirty="0"/>
+              <a:t> 1 USD = </a:t>
+            </a:r>
+            <a:r>
+              <a:rPr lang="en-US" dirty="0" smtClean="0"/>
+              <a:t>565 </a:t>
+            </a:r>
+            <a:r>
+              <a:rPr lang="en-US" dirty="0" err="1"/>
+              <a:t>colones</a:t>
+            </a:r>
+            <a:endParaRPr lang="en-US" dirty="0"/>
+          </a:p>
+          <a:p>
+            <a:pPr lvl="1"/>
+            <a:r>
+              <a:rPr lang="en-US" dirty="0" err="1"/>
+              <a:t>Tipo</a:t>
+            </a:r>
+            <a:r>
+              <a:rPr lang="en-US" dirty="0"/>
+              <a:t> de </a:t>
+            </a:r>
+            <a:r>
+              <a:rPr lang="en-US" dirty="0" err="1"/>
+              <a:t>cambio</a:t>
+            </a:r>
+            <a:r>
+              <a:rPr lang="en-US" dirty="0"/>
+              <a:t> del euro 1 EUR = </a:t>
+            </a:r>
+            <a:r>
+              <a:rPr lang="en-US" dirty="0" smtClean="0"/>
+              <a:t>720 </a:t>
+            </a:r>
+            <a:r>
+              <a:rPr lang="en-US" dirty="0" err="1"/>
+              <a:t>colones</a:t>
+            </a:r>
+            <a:endParaRPr lang="en-US" dirty="0"/>
+          </a:p>
+          <a:p>
+            <a:endParaRPr lang="en-US" dirty="0"/>
+          </a:p>
+        </p:txBody>
+      </p:sp>
+    </p:spTree>
+    <p:extLst>
+      <p:ext uri="{BB962C8B-B14F-4D97-AF65-F5344CB8AC3E}">
+        <p14:creationId xmlns:p14="http://schemas.microsoft.com/office/powerpoint/2010/main" val="3968369645"/>
+      </p:ext>
+    </p:extLst>
+  </p:cSld>
+  <p:clrMapOvr>
+    <a:masterClrMapping/>
+  </p:clrMapOvr>
+  <p:timing>
+    <p:tnLst>
+      <p:par>
+        <p:cTn id="1" dur="indefinite" restart="never" nodeType="tmRoot"/>
+      </p:par>
+    </p:tnLst>
+  </p:timing>
+</p:sld>
+</file>
+
+<file path=ppt/slides/slide11.xml><?xml version="1.0" encoding="utf-8"?>
+<p:sld xmlns:a="http://schemas.openxmlformats.org/drawingml/2006/main" xmlns:r="http://schemas.openxmlformats.org/officeDocument/2006/relationships" xmlns:p="http://schemas.openxmlformats.org/presentationml/2006/main">
+  <p:cSld>
+    <p:spTree>
+      <p:nvGrpSpPr>
+        <p:cNvPr id="1" name=""/>
+        <p:cNvGrpSpPr/>
+        <p:nvPr/>
+      </p:nvGrpSpPr>
+      <p:grpSpPr>
+        <a:xfrm>
+          <a:off x="0" y="0"/>
+          <a:ext cx="0" cy="0"/>
+          <a:chOff x="0" y="0"/>
+          <a:chExt cx="0" cy="0"/>
+        </a:xfrm>
+      </p:grpSpPr>
+      <p:sp>
+        <p:nvSpPr>
+          <p:cNvPr id="2" name="Title 1"/>
+          <p:cNvSpPr>
+            <a:spLocks noGrp="1"/>
+          </p:cNvSpPr>
+          <p:nvPr>
+            <p:ph type="title"/>
+          </p:nvPr>
+        </p:nvSpPr>
+        <p:spPr/>
+        <p:txBody>
+          <a:bodyPr/>
+          <a:lstStyle/>
+          <a:p>
+            <a:r>
+              <a:rPr lang="en-US" dirty="0" smtClean="0"/>
+              <a:t>Java – </a:t>
+            </a:r>
+            <a:r>
+              <a:rPr lang="en-US" dirty="0" err="1" smtClean="0"/>
+              <a:t>ejercicio</a:t>
+            </a:r>
+            <a:r>
+              <a:rPr lang="en-US" dirty="0" err="1" smtClean="0"/>
+              <a:t>s</a:t>
+            </a:r>
+            <a:endParaRPr lang="en-US" dirty="0"/>
+          </a:p>
+        </p:txBody>
+      </p:sp>
+      <p:sp>
+        <p:nvSpPr>
+          <p:cNvPr id="3" name="Content Placeholder 2"/>
+          <p:cNvSpPr>
+            <a:spLocks noGrp="1"/>
+          </p:cNvSpPr>
+          <p:nvPr>
+            <p:ph idx="1"/>
+          </p:nvPr>
+        </p:nvSpPr>
+        <p:spPr/>
+        <p:txBody>
+          <a:bodyPr/>
+          <a:lstStyle/>
+          <a:p>
+            <a:r>
+              <a:rPr lang="en-US" dirty="0" err="1"/>
+              <a:t>Construya</a:t>
+            </a:r>
+            <a:r>
+              <a:rPr lang="en-US" dirty="0"/>
+              <a:t> un </a:t>
+            </a:r>
+            <a:r>
+              <a:rPr lang="en-US" dirty="0" err="1"/>
+              <a:t>programa</a:t>
+            </a:r>
+            <a:r>
+              <a:rPr lang="en-US" dirty="0"/>
+              <a:t> </a:t>
+            </a:r>
+            <a:r>
+              <a:rPr lang="en-US" dirty="0" err="1"/>
+              <a:t>que</a:t>
+            </a:r>
+            <a:r>
+              <a:rPr lang="en-US" dirty="0"/>
+              <a:t> le </a:t>
+            </a:r>
+            <a:r>
+              <a:rPr lang="en-US" dirty="0" err="1"/>
+              <a:t>muestre</a:t>
+            </a:r>
+            <a:r>
+              <a:rPr lang="en-US" dirty="0"/>
+              <a:t> un </a:t>
+            </a:r>
+            <a:r>
+              <a:rPr lang="en-US" dirty="0" err="1"/>
+              <a:t>menú</a:t>
+            </a:r>
+            <a:r>
+              <a:rPr lang="en-US" dirty="0"/>
+              <a:t> con </a:t>
+            </a:r>
+            <a:r>
+              <a:rPr lang="en-US" dirty="0" err="1"/>
+              <a:t>opciones</a:t>
+            </a:r>
+            <a:r>
+              <a:rPr lang="en-US" dirty="0"/>
+              <a:t> de </a:t>
+            </a:r>
+            <a:r>
+              <a:rPr lang="en-US" dirty="0" err="1"/>
+              <a:t>figuras</a:t>
+            </a:r>
+            <a:r>
+              <a:rPr lang="en-US" dirty="0"/>
+              <a:t>, </a:t>
+            </a:r>
+            <a:r>
+              <a:rPr lang="en-US" dirty="0" err="1"/>
+              <a:t>cuadrado</a:t>
+            </a:r>
+            <a:r>
+              <a:rPr lang="en-US" dirty="0"/>
+              <a:t>, </a:t>
+            </a:r>
+            <a:r>
+              <a:rPr lang="en-US" dirty="0" err="1"/>
+              <a:t>triángulo</a:t>
+            </a:r>
+            <a:r>
+              <a:rPr lang="en-US" dirty="0"/>
+              <a:t> o </a:t>
+            </a:r>
+            <a:r>
+              <a:rPr lang="en-US" dirty="0" err="1"/>
+              <a:t>círculo</a:t>
+            </a:r>
+            <a:r>
+              <a:rPr lang="en-US" dirty="0"/>
+              <a:t>. </a:t>
+            </a:r>
+            <a:r>
+              <a:rPr lang="en-US" dirty="0" err="1"/>
+              <a:t>Una</a:t>
+            </a:r>
+            <a:r>
+              <a:rPr lang="en-US" dirty="0"/>
+              <a:t> </a:t>
+            </a:r>
+            <a:r>
+              <a:rPr lang="en-US" dirty="0" err="1"/>
+              <a:t>vez</a:t>
+            </a:r>
+            <a:r>
+              <a:rPr lang="en-US" dirty="0"/>
+              <a:t> </a:t>
+            </a:r>
+            <a:r>
+              <a:rPr lang="en-US" dirty="0" err="1"/>
+              <a:t>que</a:t>
+            </a:r>
+            <a:r>
+              <a:rPr lang="en-US" dirty="0"/>
+              <a:t> el </a:t>
+            </a:r>
+            <a:r>
+              <a:rPr lang="en-US" dirty="0" err="1"/>
+              <a:t>usuario</a:t>
+            </a:r>
+            <a:r>
+              <a:rPr lang="en-US" dirty="0"/>
+              <a:t> </a:t>
+            </a:r>
+            <a:r>
+              <a:rPr lang="en-US" dirty="0" err="1"/>
+              <a:t>escoja</a:t>
+            </a:r>
+            <a:r>
+              <a:rPr lang="en-US" dirty="0"/>
+              <a:t> la </a:t>
+            </a:r>
+            <a:r>
+              <a:rPr lang="en-US" dirty="0" err="1"/>
+              <a:t>figura</a:t>
+            </a:r>
+            <a:r>
+              <a:rPr lang="en-US" dirty="0"/>
+              <a:t>, se le </a:t>
+            </a:r>
+            <a:r>
+              <a:rPr lang="en-US" dirty="0" err="1"/>
+              <a:t>pregunta</a:t>
+            </a:r>
+            <a:r>
+              <a:rPr lang="en-US" dirty="0"/>
+              <a:t> </a:t>
+            </a:r>
+            <a:r>
+              <a:rPr lang="en-US" dirty="0" err="1"/>
+              <a:t>si</a:t>
+            </a:r>
+            <a:r>
+              <a:rPr lang="en-US" dirty="0"/>
+              <a:t> </a:t>
+            </a:r>
+            <a:r>
+              <a:rPr lang="en-US" dirty="0" err="1"/>
+              <a:t>desea</a:t>
+            </a:r>
+            <a:r>
+              <a:rPr lang="en-US" dirty="0"/>
+              <a:t> </a:t>
+            </a:r>
+            <a:r>
+              <a:rPr lang="en-US" dirty="0" err="1"/>
+              <a:t>calcular</a:t>
+            </a:r>
+            <a:r>
+              <a:rPr lang="en-US" dirty="0"/>
+              <a:t> el </a:t>
+            </a:r>
+            <a:r>
+              <a:rPr lang="en-US" dirty="0" err="1"/>
+              <a:t>perímetro</a:t>
+            </a:r>
+            <a:r>
+              <a:rPr lang="en-US" dirty="0"/>
+              <a:t> o el </a:t>
+            </a:r>
+            <a:r>
+              <a:rPr lang="en-US" dirty="0" err="1"/>
+              <a:t>área</a:t>
+            </a:r>
+            <a:r>
+              <a:rPr lang="en-US" dirty="0"/>
+              <a:t>. </a:t>
+            </a:r>
+            <a:r>
+              <a:rPr lang="en-US" dirty="0" smtClean="0"/>
+              <a:t>En </a:t>
+            </a:r>
+            <a:r>
+              <a:rPr lang="en-US" dirty="0" err="1" smtClean="0"/>
+              <a:t>caso</a:t>
+            </a:r>
+            <a:r>
+              <a:rPr lang="en-US" dirty="0" smtClean="0"/>
+              <a:t> de </a:t>
+            </a:r>
+            <a:r>
+              <a:rPr lang="en-US" dirty="0" err="1" smtClean="0"/>
+              <a:t>escoger</a:t>
+            </a:r>
+            <a:r>
+              <a:rPr lang="en-US" dirty="0" smtClean="0"/>
+              <a:t> area se </a:t>
+            </a:r>
+            <a:r>
+              <a:rPr lang="en-US" dirty="0"/>
+              <a:t>le </a:t>
+            </a:r>
+            <a:r>
+              <a:rPr lang="en-US" dirty="0" err="1"/>
+              <a:t>pide</a:t>
+            </a:r>
+            <a:r>
+              <a:rPr lang="en-US" dirty="0"/>
+              <a:t> </a:t>
+            </a:r>
+            <a:r>
+              <a:rPr lang="en-US" dirty="0" err="1"/>
+              <a:t>que</a:t>
+            </a:r>
+            <a:r>
+              <a:rPr lang="en-US" dirty="0"/>
+              <a:t> </a:t>
+            </a:r>
+            <a:r>
+              <a:rPr lang="en-US" dirty="0" err="1" smtClean="0"/>
+              <a:t>ingrese</a:t>
+            </a:r>
+            <a:r>
+              <a:rPr lang="en-US" dirty="0"/>
+              <a:t> </a:t>
+            </a:r>
+            <a:r>
+              <a:rPr lang="en-US" dirty="0" smtClean="0"/>
+              <a:t>el valor del </a:t>
+            </a:r>
+            <a:r>
+              <a:rPr lang="en-US" dirty="0" err="1" smtClean="0"/>
+              <a:t>lado</a:t>
+            </a:r>
+            <a:r>
+              <a:rPr lang="en-US" dirty="0" smtClean="0"/>
+              <a:t>, en </a:t>
+            </a:r>
+            <a:r>
+              <a:rPr lang="en-US" dirty="0" err="1" smtClean="0"/>
+              <a:t>caso</a:t>
+            </a:r>
+            <a:r>
+              <a:rPr lang="en-US" dirty="0" smtClean="0"/>
+              <a:t> del </a:t>
+            </a:r>
+            <a:r>
+              <a:rPr lang="en-US" dirty="0" err="1" smtClean="0"/>
+              <a:t>cuadrado</a:t>
+            </a:r>
+            <a:r>
+              <a:rPr lang="en-US" dirty="0" smtClean="0"/>
+              <a:t>, el valor de la base y la </a:t>
+            </a:r>
+            <a:r>
+              <a:rPr lang="en-US" dirty="0" err="1" smtClean="0"/>
+              <a:t>altura</a:t>
+            </a:r>
+            <a:r>
+              <a:rPr lang="en-US" dirty="0" smtClean="0"/>
+              <a:t>, en </a:t>
+            </a:r>
+            <a:r>
+              <a:rPr lang="en-US" dirty="0" err="1" smtClean="0"/>
+              <a:t>caso</a:t>
+            </a:r>
+            <a:r>
+              <a:rPr lang="en-US" dirty="0" smtClean="0"/>
+              <a:t> del </a:t>
+            </a:r>
+            <a:r>
+              <a:rPr lang="en-US" dirty="0" err="1" smtClean="0"/>
+              <a:t>triángulo</a:t>
+            </a:r>
+            <a:r>
+              <a:rPr lang="en-US" dirty="0" smtClean="0"/>
+              <a:t> y el radio en </a:t>
+            </a:r>
+            <a:r>
+              <a:rPr lang="en-US" dirty="0" err="1" smtClean="0"/>
+              <a:t>caso</a:t>
+            </a:r>
+            <a:r>
+              <a:rPr lang="en-US" dirty="0" smtClean="0"/>
+              <a:t> del </a:t>
+            </a:r>
+            <a:r>
+              <a:rPr lang="en-US" dirty="0" err="1" smtClean="0"/>
+              <a:t>círculo</a:t>
+            </a:r>
+            <a:r>
+              <a:rPr lang="en-US" dirty="0" smtClean="0"/>
+              <a:t>. Si </a:t>
+            </a:r>
+            <a:r>
+              <a:rPr lang="en-US" dirty="0" err="1" smtClean="0"/>
+              <a:t>escogió</a:t>
+            </a:r>
+            <a:r>
+              <a:rPr lang="en-US" dirty="0" smtClean="0"/>
+              <a:t> </a:t>
+            </a:r>
+            <a:r>
+              <a:rPr lang="en-US" dirty="0" err="1" smtClean="0"/>
+              <a:t>perímetro</a:t>
+            </a:r>
+            <a:r>
+              <a:rPr lang="en-US" dirty="0" smtClean="0"/>
+              <a:t> se le </a:t>
+            </a:r>
+            <a:r>
+              <a:rPr lang="en-US" dirty="0" err="1" smtClean="0"/>
+              <a:t>pide</a:t>
+            </a:r>
+            <a:r>
+              <a:rPr lang="en-US" dirty="0" smtClean="0"/>
+              <a:t> el valor de los </a:t>
+            </a:r>
+            <a:r>
+              <a:rPr lang="en-US" dirty="0" err="1" smtClean="0"/>
+              <a:t>cuatro</a:t>
+            </a:r>
+            <a:r>
+              <a:rPr lang="en-US" dirty="0" smtClean="0"/>
+              <a:t> </a:t>
+            </a:r>
+            <a:r>
+              <a:rPr lang="en-US" dirty="0" err="1" smtClean="0"/>
+              <a:t>lados</a:t>
+            </a:r>
+            <a:r>
+              <a:rPr lang="en-US" dirty="0" smtClean="0"/>
+              <a:t> en </a:t>
+            </a:r>
+            <a:r>
+              <a:rPr lang="en-US" dirty="0" err="1" smtClean="0"/>
+              <a:t>caso</a:t>
+            </a:r>
+            <a:r>
+              <a:rPr lang="en-US" dirty="0" smtClean="0"/>
+              <a:t> del </a:t>
+            </a:r>
+            <a:r>
+              <a:rPr lang="en-US" dirty="0" err="1" smtClean="0"/>
+              <a:t>cuadrado</a:t>
+            </a:r>
+            <a:r>
+              <a:rPr lang="en-US" dirty="0" smtClean="0"/>
+              <a:t>, </a:t>
+            </a:r>
+            <a:r>
+              <a:rPr lang="en-US" dirty="0" err="1" smtClean="0"/>
+              <a:t>tres</a:t>
+            </a:r>
+            <a:r>
+              <a:rPr lang="en-US" dirty="0" smtClean="0"/>
+              <a:t> </a:t>
+            </a:r>
+            <a:r>
+              <a:rPr lang="en-US" dirty="0" err="1" smtClean="0"/>
+              <a:t>lados</a:t>
+            </a:r>
+            <a:r>
+              <a:rPr lang="en-US" dirty="0" smtClean="0"/>
+              <a:t> en </a:t>
+            </a:r>
+            <a:r>
+              <a:rPr lang="en-US" dirty="0" err="1" smtClean="0"/>
+              <a:t>caso</a:t>
+            </a:r>
+            <a:r>
+              <a:rPr lang="en-US" dirty="0" smtClean="0"/>
+              <a:t> del </a:t>
+            </a:r>
+            <a:r>
+              <a:rPr lang="en-US" dirty="0" err="1" smtClean="0"/>
+              <a:t>triángulo</a:t>
+            </a:r>
+            <a:r>
+              <a:rPr lang="en-US" dirty="0" smtClean="0"/>
+              <a:t> y el radio en </a:t>
+            </a:r>
+            <a:r>
+              <a:rPr lang="en-US" dirty="0" err="1" smtClean="0"/>
+              <a:t>caso</a:t>
+            </a:r>
+            <a:r>
+              <a:rPr lang="en-US" dirty="0" smtClean="0"/>
+              <a:t> del </a:t>
+            </a:r>
+            <a:r>
+              <a:rPr lang="en-US" dirty="0" err="1" smtClean="0"/>
+              <a:t>círculo</a:t>
+            </a:r>
+            <a:r>
+              <a:rPr lang="en-US" dirty="0" smtClean="0"/>
+              <a:t> </a:t>
+            </a:r>
+            <a:r>
+              <a:rPr lang="en-US" dirty="0" err="1" smtClean="0"/>
+              <a:t>Una</a:t>
+            </a:r>
+            <a:r>
+              <a:rPr lang="en-US" dirty="0" smtClean="0"/>
+              <a:t> </a:t>
+            </a:r>
+            <a:r>
+              <a:rPr lang="en-US" dirty="0" err="1" smtClean="0"/>
+              <a:t>vez</a:t>
+            </a:r>
+            <a:r>
+              <a:rPr lang="en-US" dirty="0" smtClean="0"/>
+              <a:t> </a:t>
+            </a:r>
+            <a:r>
+              <a:rPr lang="en-US" dirty="0" err="1" smtClean="0"/>
+              <a:t>que</a:t>
+            </a:r>
+            <a:r>
+              <a:rPr lang="en-US" dirty="0" smtClean="0"/>
+              <a:t> </a:t>
+            </a:r>
+            <a:r>
+              <a:rPr lang="en-US" dirty="0" err="1" smtClean="0"/>
+              <a:t>haya</a:t>
+            </a:r>
+            <a:r>
+              <a:rPr lang="en-US" dirty="0" smtClean="0"/>
+              <a:t> </a:t>
+            </a:r>
+            <a:r>
+              <a:rPr lang="en-US" dirty="0" err="1" smtClean="0"/>
+              <a:t>ingresado</a:t>
+            </a:r>
+            <a:r>
+              <a:rPr lang="en-US" dirty="0" smtClean="0"/>
+              <a:t> </a:t>
+            </a:r>
+            <a:r>
+              <a:rPr lang="en-US" dirty="0" err="1" smtClean="0"/>
+              <a:t>dicha</a:t>
+            </a:r>
+            <a:r>
+              <a:rPr lang="en-US" dirty="0" smtClean="0"/>
+              <a:t> </a:t>
+            </a:r>
+            <a:r>
+              <a:rPr lang="en-US" dirty="0" err="1" smtClean="0"/>
+              <a:t>información</a:t>
+            </a:r>
+            <a:r>
+              <a:rPr lang="en-US" dirty="0" smtClean="0"/>
+              <a:t>, se le </a:t>
+            </a:r>
+            <a:r>
+              <a:rPr lang="en-US" dirty="0" err="1" smtClean="0"/>
+              <a:t>despliega</a:t>
+            </a:r>
+            <a:r>
+              <a:rPr lang="en-US" dirty="0" smtClean="0"/>
+              <a:t> el </a:t>
+            </a:r>
+            <a:r>
+              <a:rPr lang="en-US" dirty="0" err="1" smtClean="0"/>
+              <a:t>resultado</a:t>
+            </a:r>
+            <a:r>
+              <a:rPr lang="en-US" dirty="0" smtClean="0"/>
+              <a:t> del </a:t>
+            </a:r>
+            <a:r>
+              <a:rPr lang="en-US" dirty="0" err="1" smtClean="0"/>
+              <a:t>cálculo</a:t>
+            </a:r>
+            <a:r>
+              <a:rPr lang="en-US" dirty="0" smtClean="0"/>
+              <a:t> </a:t>
+            </a:r>
+            <a:r>
+              <a:rPr lang="en-US" dirty="0" err="1" smtClean="0"/>
+              <a:t>solicitado</a:t>
+            </a:r>
+            <a:r>
+              <a:rPr lang="en-US" dirty="0" smtClean="0"/>
+              <a:t>.</a:t>
+            </a:r>
+          </a:p>
+        </p:txBody>
+      </p:sp>
+    </p:spTree>
+    <p:extLst>
+      <p:ext uri="{BB962C8B-B14F-4D97-AF65-F5344CB8AC3E}">
+        <p14:creationId xmlns:p14="http://schemas.microsoft.com/office/powerpoint/2010/main" val="468746046"/>
+      </p:ext>
+    </p:extLst>
+  </p:cSld>
+  <p:clrMapOvr>
+    <a:masterClrMapping/>
+  </p:clrMapOvr>
+  <p:timing>
+    <p:tnLst>
+      <p:par>
+        <p:cTn id="1" dur="indefinite" restart="never" nodeType="tmRoot"/>
+      </p:par>
+    </p:tnLst>
+  </p:timing>
+</p:sld>
+</file>
+
+<file path=ppt/slides/slide12.xml><?xml version="1.0" encoding="utf-8"?>
+<p:sld xmlns:a="http://schemas.openxmlformats.org/drawingml/2006/main" xmlns:r="http://schemas.openxmlformats.org/officeDocument/2006/relationships" xmlns:p="http://schemas.openxmlformats.org/presentationml/2006/main">
+  <p:cSld>
+    <p:spTree>
+      <p:nvGrpSpPr>
+        <p:cNvPr id="1" name=""/>
+        <p:cNvGrpSpPr/>
+        <p:nvPr/>
+      </p:nvGrpSpPr>
+      <p:grpSpPr>
+        <a:xfrm>
+          <a:off x="0" y="0"/>
+          <a:ext cx="0" cy="0"/>
+          <a:chOff x="0" y="0"/>
+          <a:chExt cx="0" cy="0"/>
+        </a:xfrm>
+      </p:grpSpPr>
+      <p:sp>
+        <p:nvSpPr>
+          <p:cNvPr id="2" name="Title 1"/>
+          <p:cNvSpPr>
+            <a:spLocks noGrp="1"/>
+          </p:cNvSpPr>
+          <p:nvPr>
+            <p:ph type="title"/>
+          </p:nvPr>
+        </p:nvSpPr>
+        <p:spPr/>
+        <p:txBody>
+          <a:bodyPr/>
+          <a:lstStyle/>
+          <a:p>
+            <a:r>
+              <a:rPr lang="en-US" dirty="0" smtClean="0"/>
+              <a:t>Java – </a:t>
+            </a:r>
+            <a:r>
+              <a:rPr lang="en-US" dirty="0" err="1" smtClean="0"/>
+              <a:t>ejercicio</a:t>
+            </a:r>
+            <a:r>
+              <a:rPr lang="en-US" dirty="0" err="1" smtClean="0"/>
+              <a:t>s</a:t>
+            </a:r>
+            <a:endParaRPr lang="en-US" dirty="0"/>
+          </a:p>
+        </p:txBody>
+      </p:sp>
+      <p:sp>
+        <p:nvSpPr>
+          <p:cNvPr id="3" name="Content Placeholder 2"/>
+          <p:cNvSpPr>
+            <a:spLocks noGrp="1"/>
+          </p:cNvSpPr>
+          <p:nvPr>
+            <p:ph idx="1"/>
+          </p:nvPr>
+        </p:nvSpPr>
+        <p:spPr/>
+        <p:txBody>
+          <a:bodyPr/>
+          <a:lstStyle/>
+          <a:p>
+            <a:r>
+              <a:rPr lang="en-US" dirty="0" err="1" smtClean="0"/>
+              <a:t>Construya</a:t>
+            </a:r>
+            <a:r>
+              <a:rPr lang="en-US" dirty="0" smtClean="0"/>
+              <a:t> un </a:t>
+            </a:r>
+            <a:r>
+              <a:rPr lang="en-US" dirty="0" err="1" smtClean="0"/>
+              <a:t>programa</a:t>
+            </a:r>
+            <a:r>
+              <a:rPr lang="en-US" dirty="0" smtClean="0"/>
+              <a:t> </a:t>
+            </a:r>
+            <a:r>
+              <a:rPr lang="en-US" dirty="0" err="1" smtClean="0"/>
+              <a:t>que</a:t>
+            </a:r>
+            <a:r>
+              <a:rPr lang="en-US" dirty="0" smtClean="0"/>
+              <a:t> </a:t>
+            </a:r>
+            <a:r>
+              <a:rPr lang="en-US" dirty="0" err="1" smtClean="0"/>
+              <a:t>calcule</a:t>
+            </a:r>
+            <a:r>
+              <a:rPr lang="en-US" dirty="0" smtClean="0"/>
+              <a:t> y </a:t>
+            </a:r>
+            <a:r>
+              <a:rPr lang="en-US" dirty="0" err="1" smtClean="0"/>
+              <a:t>despliegue</a:t>
+            </a:r>
+            <a:r>
+              <a:rPr lang="en-US" dirty="0" smtClean="0"/>
+              <a:t> los </a:t>
+            </a:r>
+            <a:r>
+              <a:rPr lang="en-US" dirty="0" err="1" smtClean="0"/>
+              <a:t>números</a:t>
+            </a:r>
+            <a:r>
+              <a:rPr lang="en-US" dirty="0" smtClean="0"/>
+              <a:t> </a:t>
+            </a:r>
+            <a:r>
+              <a:rPr lang="en-US" dirty="0" err="1" smtClean="0"/>
+              <a:t>primos</a:t>
+            </a:r>
+            <a:r>
+              <a:rPr lang="en-US" dirty="0" smtClean="0"/>
+              <a:t> del 1 al 50.</a:t>
+            </a:r>
+          </a:p>
+          <a:p>
+            <a:r>
+              <a:rPr lang="en-US" dirty="0" err="1" smtClean="0"/>
+              <a:t>Construya</a:t>
+            </a:r>
+            <a:r>
+              <a:rPr lang="en-US" dirty="0" smtClean="0"/>
+              <a:t> un </a:t>
+            </a:r>
+            <a:r>
+              <a:rPr lang="en-US" dirty="0" err="1" smtClean="0"/>
+              <a:t>programa</a:t>
+            </a:r>
+            <a:r>
+              <a:rPr lang="en-US" dirty="0" smtClean="0"/>
+              <a:t> </a:t>
+            </a:r>
+            <a:r>
+              <a:rPr lang="en-US" dirty="0" err="1" smtClean="0"/>
+              <a:t>que</a:t>
+            </a:r>
+            <a:r>
+              <a:rPr lang="en-US" dirty="0" smtClean="0"/>
+              <a:t> </a:t>
+            </a:r>
+            <a:r>
+              <a:rPr lang="en-US" dirty="0" err="1" smtClean="0"/>
+              <a:t>reciba</a:t>
+            </a:r>
+            <a:r>
+              <a:rPr lang="en-US" dirty="0" smtClean="0"/>
+              <a:t> </a:t>
+            </a:r>
+            <a:r>
+              <a:rPr lang="en-US" dirty="0" err="1" smtClean="0"/>
+              <a:t>una</a:t>
+            </a:r>
+            <a:r>
+              <a:rPr lang="en-US" dirty="0" smtClean="0"/>
+              <a:t> </a:t>
+            </a:r>
+            <a:r>
+              <a:rPr lang="en-US" dirty="0" err="1" smtClean="0"/>
+              <a:t>cantidad</a:t>
+            </a:r>
+            <a:r>
+              <a:rPr lang="en-US" dirty="0" smtClean="0"/>
+              <a:t> en </a:t>
+            </a:r>
+            <a:r>
+              <a:rPr lang="en-US" dirty="0" err="1" smtClean="0"/>
+              <a:t>días</a:t>
+            </a:r>
+            <a:r>
+              <a:rPr lang="en-US" dirty="0" smtClean="0"/>
+              <a:t> y </a:t>
+            </a:r>
+            <a:r>
+              <a:rPr lang="en-US" dirty="0" err="1" smtClean="0"/>
+              <a:t>despliegue</a:t>
+            </a:r>
+            <a:r>
+              <a:rPr lang="en-US" dirty="0" smtClean="0"/>
+              <a:t> </a:t>
+            </a:r>
+            <a:r>
+              <a:rPr lang="en-US" dirty="0" err="1" smtClean="0"/>
+              <a:t>su</a:t>
+            </a:r>
+            <a:r>
+              <a:rPr lang="en-US" dirty="0" smtClean="0"/>
+              <a:t> </a:t>
+            </a:r>
+            <a:r>
+              <a:rPr lang="en-US" dirty="0" err="1" smtClean="0"/>
+              <a:t>equivalente</a:t>
+            </a:r>
+            <a:r>
+              <a:rPr lang="en-US" dirty="0" smtClean="0"/>
+              <a:t> en </a:t>
+            </a:r>
+            <a:r>
+              <a:rPr lang="en-US" dirty="0" err="1" smtClean="0"/>
+              <a:t>segundos</a:t>
+            </a:r>
+            <a:r>
+              <a:rPr lang="en-US" dirty="0" smtClean="0"/>
+              <a:t>. </a:t>
+            </a:r>
+            <a:endParaRPr lang="en-US" dirty="0"/>
+          </a:p>
+        </p:txBody>
+      </p:sp>
+    </p:spTree>
+    <p:extLst>
+      <p:ext uri="{BB962C8B-B14F-4D97-AF65-F5344CB8AC3E}">
+        <p14:creationId xmlns:p14="http://schemas.microsoft.com/office/powerpoint/2010/main" val="443613877"/>
       </p:ext>
     </p:extLst>
   </p:cSld>
@@ -4836,11 +6181,7 @@
           <a:p>
             <a:r>
               <a:rPr lang="en-US" dirty="0" smtClean="0"/>
-              <a:t>Java </a:t>
-            </a:r>
-            <a:r>
-              <a:rPr lang="en-US" dirty="0" smtClean="0"/>
-              <a:t>– </a:t>
+              <a:t>Java – </a:t>
             </a:r>
             <a:r>
               <a:rPr lang="en-US" dirty="0" err="1" smtClean="0"/>
@@ -6039,7 +7380,6 @@
               <a:rPr lang="en-US" dirty="0" smtClean="0"/>
               <a:t>{</a:t>
             </a:r>
-            <a:endParaRPr lang="en-US" dirty="0" smtClean="0"/>
           </a:p>
           <a:p>
             <a:pPr lvl="1"/>
@@ -6069,7 +7409,6 @@
               <a:rPr lang="en-US" dirty="0" smtClean="0"/>
               <a:t>){</a:t>
             </a:r>
-            <a:endParaRPr lang="en-US" dirty="0" smtClean="0"/>
           </a:p>
           <a:p>
             <a:pPr lvl="1"/>
@@ -6087,13 +7426,8 @@
             </a:r>
             <a:r>
               <a:rPr lang="en-US" dirty="0" smtClean="0"/>
-              <a:t> mayor a </a:t>
-            </a:r>
-            <a:r>
-              <a:rPr lang="en-US" dirty="0" smtClean="0"/>
-              <a:t>A”);</a:t>
-            </a:r>
-            <a:endParaRPr lang="en-US" dirty="0" smtClean="0"/>
+              <a:t> mayor a A”);</a:t>
+            </a:r>
           </a:p>
           <a:p>
             <a:r>
@@ -6126,13 +7460,8 @@
             </a:r>
             <a:r>
               <a:rPr lang="en-US" dirty="0" smtClean="0"/>
-              <a:t> a </a:t>
-            </a:r>
-            <a:r>
-              <a:rPr lang="en-US" dirty="0" smtClean="0"/>
-              <a:t>B”);</a:t>
-            </a:r>
-            <a:endParaRPr lang="en-US" dirty="0" smtClean="0"/>
+              <a:t> a B”);</a:t>
+            </a:r>
           </a:p>
           <a:p>
             <a:r>
@@ -6710,11 +8039,7 @@
           <a:p>
             <a:r>
               <a:rPr lang="en-US" dirty="0" smtClean="0"/>
-              <a:t>Java </a:t>
-            </a:r>
-            <a:r>
-              <a:rPr lang="en-US" dirty="0" smtClean="0"/>
-              <a:t>– </a:t>
+              <a:t>Java – </a:t>
             </a:r>
             <a:r>
               <a:rPr lang="en-US" dirty="0" err="1" smtClean="0"/>

</xml_diff>